<commit_message>
Added computer room number to PPT
</commit_message>
<xml_diff>
--- a/PSR_Velos-Pro_Introduction_PW.pptx
+++ b/PSR_Velos-Pro_Introduction_PW.pptx
@@ -1018,7 +1018,29 @@
           <a:p>
             <a:r>
               <a:rPr lang="en-US" dirty="0"/>
-              <a:t>Operation of the instrument requires training by the OHSU PSR core staff. Analysis of the generated data is also part of the instrument use. The OHSU PSR core has proprietary vendor software on core computers available for use. The PSR core staff provide training in the software use. The analysis of the types of data generated by the </a:t>
+              <a:t>Operation of the instrument requires training by the OHSU PSR core staff. Analysis of the generated data is also part of the instrument use. The OHSU PSR core has proprietary vendor software on core computers available </a:t>
+            </a:r>
+            <a:r>
+              <a:rPr lang="en-US"/>
+              <a:t>for use in </a:t>
+            </a:r>
+            <a:r>
+              <a:rPr lang="en-US" dirty="0"/>
+              <a:t>room </a:t>
+            </a:r>
+            <a:r>
+              <a:rPr lang="en-US" sz="2200" b="0" i="0" u="none" strike="noStrike" dirty="0">
+                <a:effectLst/>
+                <a:latin typeface="Helvetica Neue"/>
+                <a:ea typeface="Helvetica Neue"/>
+                <a:cs typeface="Helvetica Neue"/>
+                <a:sym typeface="Helvetica Neue"/>
+              </a:rPr>
+              <a:t>MRBA528</a:t>
+            </a:r>
+            <a:r>
+              <a:rPr lang="en-US" dirty="0"/>
+              <a:t>. The PSR core staff provide training in the software use. The analysis of the types of data generated by the </a:t>
             </a:r>
             <a:r>
               <a:rPr lang="en-US" dirty="0" err="1"/>
@@ -1026,15 +1048,7 @@
             </a:r>
             <a:r>
               <a:rPr lang="en-US" dirty="0"/>
-              <a:t> Pro is within the capabilities of trained users, and users are expected </a:t>
-            </a:r>
-            <a:r>
-              <a:rPr lang="en-US"/>
-              <a:t>to perform </a:t>
-            </a:r>
-            <a:r>
-              <a:rPr lang="en-US" dirty="0"/>
-              <a:t>their own analysis. The core staff is happy to answer any questions and provide help. </a:t>
+              <a:t> Pro is within the capabilities of trained users, and users are expected to perform their own analysis. The core staff is happy to answer any questions and provide help. </a:t>
             </a:r>
           </a:p>
         </p:txBody>
@@ -2723,7 +2737,7 @@
           </a:ln>
           <a:extLst>
             <a:ext uri="{C572A759-6A51-4108-AA02-DFA0A04FC94B}">
-              <ma14:wrappingTextBoxFlag xmlns="" xmlns:m="http://schemas.openxmlformats.org/officeDocument/2006/math" xmlns:a14="http://schemas.microsoft.com/office/drawing/2010/main" xmlns:ma14="http://schemas.microsoft.com/office/mac/drawingml/2011/main" val="1"/>
+              <ma14:wrappingTextBoxFlag xmlns:ma14="http://schemas.microsoft.com/office/mac/drawingml/2011/main" xmlns:a14="http://schemas.microsoft.com/office/drawing/2010/main" xmlns:m="http://schemas.openxmlformats.org/officeDocument/2006/math" xmlns="" val="1"/>
             </a:ext>
           </a:extLst>
         </p:spPr>
@@ -2762,7 +2776,7 @@
           </a:ln>
           <a:extLst>
             <a:ext uri="{C572A759-6A51-4108-AA02-DFA0A04FC94B}">
-              <ma14:wrappingTextBoxFlag xmlns="" xmlns:m="http://schemas.openxmlformats.org/officeDocument/2006/math" xmlns:a14="http://schemas.microsoft.com/office/drawing/2010/main" xmlns:ma14="http://schemas.microsoft.com/office/mac/drawingml/2011/main" val="1"/>
+              <ma14:wrappingTextBoxFlag xmlns:ma14="http://schemas.microsoft.com/office/mac/drawingml/2011/main" xmlns:a14="http://schemas.microsoft.com/office/drawing/2010/main" xmlns:m="http://schemas.openxmlformats.org/officeDocument/2006/math" xmlns="" val="1"/>
             </a:ext>
           </a:extLst>
         </p:spPr>
@@ -4361,7 +4375,9 @@
           </a:prstGeom>
         </p:spPr>
         <p:txBody>
-          <a:bodyPr/>
+          <a:bodyPr>
+            <a:normAutofit fontScale="90000"/>
+          </a:bodyPr>
           <a:lstStyle>
             <a:lvl1pPr defTabSz="484886">
               <a:defRPr sz="6640"/>
@@ -4588,17 +4604,28 @@
           <a:lstStyle/>
           <a:p>
             <a:r>
+              <a:rPr dirty="0"/>
               <a:t>Training in the data analysis software will be performed by PSR personnel. </a:t>
             </a:r>
           </a:p>
           <a:p>
             <a:r>
+              <a:rPr dirty="0"/>
               <a:t>Users are expected to perform their own data analysis with advice and support provided if needed.</a:t>
             </a:r>
           </a:p>
           <a:p>
             <a:r>
-              <a:t>The PSR has a computer center in Room 52X available for data analysis. </a:t>
+              <a:rPr dirty="0"/>
+              <a:t>The PSR has a computer center in Room </a:t>
+            </a:r>
+            <a:r>
+              <a:rPr lang="en-US" dirty="0"/>
+              <a:t>MRBA528</a:t>
+            </a:r>
+            <a:r>
+              <a:rPr dirty="0"/>
+              <a:t> available for data analysis. </a:t>
             </a:r>
           </a:p>
         </p:txBody>

</xml_diff>